<commit_message>
Nueva ppt de modificar dockerfile
</commit_message>
<xml_diff>
--- a/trabajos/02-introduccion-docker.pptx
+++ b/trabajos/02-introduccion-docker.pptx
@@ -19,8 +19,8 @@
     <p:sldId id="633" r:id="rId10"/>
     <p:sldId id="643" r:id="rId11"/>
     <p:sldId id="644" r:id="rId12"/>
-    <p:sldId id="634" r:id="rId13"/>
-    <p:sldId id="635" r:id="rId14"/>
+    <p:sldId id="645" r:id="rId13"/>
+    <p:sldId id="634" r:id="rId14"/>
     <p:sldId id="636" r:id="rId15"/>
     <p:sldId id="642" r:id="rId16"/>
   </p:sldIdLst>
@@ -741,7 +741,7 @@
     </p:spTree>
     <p:extLst>
       <p:ext uri="{BB962C8B-B14F-4D97-AF65-F5344CB8AC3E}">
-        <p14:creationId xmlns:p14="http://schemas.microsoft.com/office/powerpoint/2010/main" val="1187407319"/>
+        <p14:creationId xmlns:p14="http://schemas.microsoft.com/office/powerpoint/2010/main" val="2399499650"/>
       </p:ext>
     </p:extLst>
   </p:cSld>
@@ -825,7 +825,7 @@
     </p:spTree>
     <p:extLst>
       <p:ext uri="{BB962C8B-B14F-4D97-AF65-F5344CB8AC3E}">
-        <p14:creationId xmlns:p14="http://schemas.microsoft.com/office/powerpoint/2010/main" val="716933578"/>
+        <p14:creationId xmlns:p14="http://schemas.microsoft.com/office/powerpoint/2010/main" val="1187407319"/>
       </p:ext>
     </p:extLst>
   </p:cSld>
@@ -7326,7 +7326,7 @@
                 </a:solidFill>
                 <a:latin typeface="Raleway" pitchFamily="2" charset="77"/>
               </a:rPr>
-              <a:t>Vamos a volver a correrlo otra vez, pero publicando uno de los puertos solamente, el este caso el 80</a:t>
+              <a:t>Vamos a volver a correrlo otra vez, pero publicando los puertos 80 y 5254</a:t>
             </a:r>
           </a:p>
           <a:p>
@@ -7593,13 +7593,40 @@
           <a:lstStyle/>
           <a:p>
             <a:r>
+              <a:rPr lang="es-AR" dirty="0">
+                <a:solidFill>
+                  <a:schemeClr val="bg2"/>
+                </a:solidFill>
+                <a:latin typeface="Raleway" pitchFamily="2" charset="77"/>
+              </a:rPr>
+              <a:t>Modificar </a:t>
+            </a:r>
+            <a:r>
               <a:rPr lang="es-AR" dirty="0" err="1">
                 <a:solidFill>
                   <a:schemeClr val="bg2"/>
                 </a:solidFill>
                 <a:latin typeface="Raleway" pitchFamily="2" charset="77"/>
               </a:rPr>
-              <a:t>Volumenes</a:t>
+              <a:t>Dockerfile</a:t>
+            </a:r>
+            <a:r>
+              <a:rPr lang="es-AR" dirty="0">
+                <a:solidFill>
+                  <a:schemeClr val="bg2"/>
+                </a:solidFill>
+                <a:latin typeface="Raleway" pitchFamily="2" charset="77"/>
+              </a:rPr>
+              <a:t> para soportar </a:t>
+            </a:r>
+            <a:r>
+              <a:rPr lang="es-AR" dirty="0" err="1">
+                <a:solidFill>
+                  <a:schemeClr val="bg2"/>
+                </a:solidFill>
+                <a:latin typeface="Raleway" pitchFamily="2" charset="77"/>
+              </a:rPr>
+              <a:t>bash</a:t>
             </a:r>
             <a:endParaRPr lang="es-AR" dirty="0">
               <a:solidFill>
@@ -7636,93 +7663,6 @@
           <a:bodyPr/>
           <a:lstStyle/>
           <a:p>
-            <a:r>
-              <a:rPr lang="es-AR" sz="1600" dirty="0">
-                <a:solidFill>
-                  <a:schemeClr val="bg2"/>
-                </a:solidFill>
-                <a:latin typeface="Raleway" pitchFamily="2" charset="77"/>
-              </a:rPr>
-              <a:t>Hasta este punto los contenedores ejecutados no tenían contacto con el exterior, ellos corrían en su propio entorno hasta que terminaran su ejecución. Ahora veremos cómo montar un volumen dentro del contenedor para visualizar por ejemplo archivos del sistema huésped:</a:t>
-            </a:r>
-          </a:p>
-          <a:p>
-            <a:r>
-              <a:rPr lang="es-AR" sz="1600" dirty="0">
-                <a:solidFill>
-                  <a:schemeClr val="bg2"/>
-                </a:solidFill>
-                <a:latin typeface="Raleway" pitchFamily="2" charset="77"/>
-              </a:rPr>
-              <a:t>Ejecutar el siguiente comando, cambiar </a:t>
-            </a:r>
-            <a:r>
-              <a:rPr lang="es-AR" sz="1600" dirty="0" err="1">
-                <a:solidFill>
-                  <a:schemeClr val="bg2"/>
-                </a:solidFill>
-                <a:latin typeface="Raleway" pitchFamily="2" charset="77"/>
-              </a:rPr>
-              <a:t>myusuario</a:t>
-            </a:r>
-            <a:r>
-              <a:rPr lang="es-AR" sz="1600" dirty="0">
-                <a:solidFill>
-                  <a:schemeClr val="bg2"/>
-                </a:solidFill>
-                <a:latin typeface="Raleway" pitchFamily="2" charset="77"/>
-              </a:rPr>
-              <a:t> por el usuario que corresponda. En </a:t>
-            </a:r>
-            <a:r>
-              <a:rPr lang="es-AR" sz="1600" dirty="0" err="1">
-                <a:solidFill>
-                  <a:schemeClr val="bg2"/>
-                </a:solidFill>
-                <a:latin typeface="Raleway" pitchFamily="2" charset="77"/>
-              </a:rPr>
-              <a:t>linux</a:t>
-            </a:r>
-            <a:r>
-              <a:rPr lang="es-AR" sz="1600" dirty="0">
-                <a:solidFill>
-                  <a:schemeClr val="bg2"/>
-                </a:solidFill>
-                <a:latin typeface="Raleway" pitchFamily="2" charset="77"/>
-              </a:rPr>
-              <a:t>/Mac puede utilizarse /home/</a:t>
-            </a:r>
-            <a:r>
-              <a:rPr lang="es-AR" sz="1600" dirty="0" err="1">
-                <a:solidFill>
-                  <a:schemeClr val="bg2"/>
-                </a:solidFill>
-                <a:latin typeface="Raleway" pitchFamily="2" charset="77"/>
-              </a:rPr>
-              <a:t>miusuario</a:t>
-            </a:r>
-            <a:r>
-              <a:rPr lang="es-AR" sz="1600" dirty="0">
-                <a:solidFill>
-                  <a:schemeClr val="bg2"/>
-                </a:solidFill>
-                <a:latin typeface="Raleway" pitchFamily="2" charset="77"/>
-              </a:rPr>
-              <a:t>):</a:t>
-            </a:r>
-          </a:p>
-          <a:p>
-            <a:pPr marL="114300" indent="0">
-              <a:buNone/>
-            </a:pPr>
-            <a:endParaRPr lang="es-AR" sz="1600" dirty="0">
-              <a:solidFill>
-                <a:schemeClr val="bg2"/>
-              </a:solidFill>
-              <a:latin typeface="Raleway" pitchFamily="2" charset="77"/>
-            </a:endParaRPr>
-          </a:p>
-          <a:p>
             <a:pPr marL="114300" indent="0" algn="ctr">
               <a:buNone/>
             </a:pPr>
@@ -7735,165 +7675,22 @@
             </a:endParaRPr>
           </a:p>
           <a:p>
-            <a:pPr marL="114300" indent="0" algn="ctr">
-              <a:buNone/>
-            </a:pPr>
-            <a:r>
-              <a:rPr lang="es-AR" sz="1600" dirty="0" err="1">
-                <a:solidFill>
-                  <a:schemeClr val="bg2"/>
-                </a:solidFill>
-                <a:latin typeface="Courier New" panose="02070309020205020404" pitchFamily="49" charset="0"/>
-                <a:cs typeface="Courier New" panose="02070309020205020404" pitchFamily="49" charset="0"/>
-              </a:rPr>
-              <a:t>docker</a:t>
-            </a:r>
             <a:r>
               <a:rPr lang="es-AR" sz="1600" dirty="0">
                 <a:solidFill>
                   <a:schemeClr val="bg2"/>
                 </a:solidFill>
-                <a:latin typeface="Courier New" panose="02070309020205020404" pitchFamily="49" charset="0"/>
-                <a:cs typeface="Courier New" panose="02070309020205020404" pitchFamily="49" charset="0"/>
-              </a:rPr>
-              <a:t> run -</a:t>
-            </a:r>
-            <a:r>
-              <a:rPr lang="es-AR" sz="1600" dirty="0" err="1">
-                <a:solidFill>
-                  <a:schemeClr val="bg2"/>
-                </a:solidFill>
-                <a:latin typeface="Courier New" panose="02070309020205020404" pitchFamily="49" charset="0"/>
-                <a:cs typeface="Courier New" panose="02070309020205020404" pitchFamily="49" charset="0"/>
-              </a:rPr>
-              <a:t>it</a:t>
-            </a:r>
-            <a:r>
-              <a:rPr lang="es-AR" sz="1600" dirty="0">
-                <a:solidFill>
-                  <a:schemeClr val="bg2"/>
-                </a:solidFill>
-                <a:latin typeface="Courier New" panose="02070309020205020404" pitchFamily="49" charset="0"/>
-                <a:cs typeface="Courier New" panose="02070309020205020404" pitchFamily="49" charset="0"/>
-              </a:rPr>
-              <a:t> -v C:\</a:t>
-            </a:r>
-            <a:r>
-              <a:rPr lang="es-AR" sz="1600" dirty="0" err="1">
-                <a:solidFill>
-                  <a:schemeClr val="bg2"/>
-                </a:solidFill>
-                <a:latin typeface="Courier New" panose="02070309020205020404" pitchFamily="49" charset="0"/>
-                <a:cs typeface="Courier New" panose="02070309020205020404" pitchFamily="49" charset="0"/>
-              </a:rPr>
-              <a:t>Users</a:t>
-            </a:r>
-            <a:r>
-              <a:rPr lang="es-AR" sz="1600" dirty="0">
-                <a:solidFill>
-                  <a:schemeClr val="bg2"/>
-                </a:solidFill>
-                <a:latin typeface="Courier New" panose="02070309020205020404" pitchFamily="49" charset="0"/>
-                <a:cs typeface="Courier New" panose="02070309020205020404" pitchFamily="49" charset="0"/>
-              </a:rPr>
-              <a:t>\</a:t>
-            </a:r>
-            <a:r>
-              <a:rPr lang="es-AR" sz="1600" dirty="0" err="1">
-                <a:solidFill>
-                  <a:schemeClr val="bg2"/>
-                </a:solidFill>
-                <a:latin typeface="Courier New" panose="02070309020205020404" pitchFamily="49" charset="0"/>
-                <a:cs typeface="Courier New" panose="02070309020205020404" pitchFamily="49" charset="0"/>
-              </a:rPr>
-              <a:t>misuario</a:t>
-            </a:r>
-            <a:r>
-              <a:rPr lang="es-AR" sz="1600" dirty="0">
-                <a:solidFill>
-                  <a:schemeClr val="bg2"/>
-                </a:solidFill>
-                <a:latin typeface="Courier New" panose="02070309020205020404" pitchFamily="49" charset="0"/>
-                <a:cs typeface="Courier New" panose="02070309020205020404" pitchFamily="49" charset="0"/>
-              </a:rPr>
-              <a:t>\Desktop:/</a:t>
-            </a:r>
-            <a:r>
-              <a:rPr lang="es-AR" sz="1600" dirty="0" err="1">
-                <a:solidFill>
-                  <a:schemeClr val="bg2"/>
-                </a:solidFill>
-                <a:latin typeface="Courier New" panose="02070309020205020404" pitchFamily="49" charset="0"/>
-                <a:cs typeface="Courier New" panose="02070309020205020404" pitchFamily="49" charset="0"/>
-              </a:rPr>
-              <a:t>var</a:t>
-            </a:r>
-            <a:r>
-              <a:rPr lang="es-AR" sz="1600" dirty="0">
-                <a:solidFill>
-                  <a:schemeClr val="bg2"/>
-                </a:solidFill>
-                <a:latin typeface="Courier New" panose="02070309020205020404" pitchFamily="49" charset="0"/>
-                <a:cs typeface="Courier New" panose="02070309020205020404" pitchFamily="49" charset="0"/>
-              </a:rPr>
-              <a:t>/escritorio </a:t>
-            </a:r>
-            <a:r>
-              <a:rPr lang="es-AR" sz="1600" dirty="0" err="1">
-                <a:solidFill>
-                  <a:schemeClr val="bg2"/>
-                </a:solidFill>
-                <a:latin typeface="Courier New" panose="02070309020205020404" pitchFamily="49" charset="0"/>
-                <a:cs typeface="Courier New" panose="02070309020205020404" pitchFamily="49" charset="0"/>
-              </a:rPr>
-              <a:t>busybox</a:t>
-            </a:r>
-            <a:r>
-              <a:rPr lang="es-AR" sz="1600" dirty="0">
-                <a:solidFill>
-                  <a:schemeClr val="bg2"/>
-                </a:solidFill>
-                <a:latin typeface="Courier New" panose="02070309020205020404" pitchFamily="49" charset="0"/>
-                <a:cs typeface="Courier New" panose="02070309020205020404" pitchFamily="49" charset="0"/>
-              </a:rPr>
-              <a:t> /</a:t>
-            </a:r>
-            <a:r>
-              <a:rPr lang="es-AR" sz="1600" dirty="0" err="1">
-                <a:solidFill>
-                  <a:schemeClr val="bg2"/>
-                </a:solidFill>
-                <a:latin typeface="Courier New" panose="02070309020205020404" pitchFamily="49" charset="0"/>
-                <a:cs typeface="Courier New" panose="02070309020205020404" pitchFamily="49" charset="0"/>
-              </a:rPr>
-              <a:t>bin</a:t>
-            </a:r>
-            <a:r>
-              <a:rPr lang="es-AR" sz="1600" dirty="0">
-                <a:solidFill>
-                  <a:schemeClr val="bg2"/>
-                </a:solidFill>
-                <a:latin typeface="Courier New" panose="02070309020205020404" pitchFamily="49" charset="0"/>
-                <a:cs typeface="Courier New" panose="02070309020205020404" pitchFamily="49" charset="0"/>
-              </a:rPr>
-              <a:t>/</a:t>
-            </a:r>
-            <a:r>
-              <a:rPr lang="es-AR" sz="1600" dirty="0" err="1">
-                <a:solidFill>
-                  <a:schemeClr val="bg2"/>
-                </a:solidFill>
-                <a:latin typeface="Courier New" panose="02070309020205020404" pitchFamily="49" charset="0"/>
-                <a:cs typeface="Courier New" panose="02070309020205020404" pitchFamily="49" charset="0"/>
-              </a:rPr>
-              <a:t>sh</a:t>
-            </a:r>
+                <a:latin typeface="Raleway" pitchFamily="2" charset="77"/>
+              </a:rPr>
+              <a:t>Modificamos </a:t>
+            </a:r>
+          </a:p>
+          <a:p>
             <a:endParaRPr lang="es-AR" sz="1600" dirty="0">
               <a:solidFill>
                 <a:schemeClr val="bg2"/>
               </a:solidFill>
-              <a:latin typeface="Courier New" panose="02070309020205020404" pitchFamily="49" charset="0"/>
-              <a:cs typeface="Courier New" panose="02070309020205020404" pitchFamily="49" charset="0"/>
+              <a:latin typeface="Raleway" pitchFamily="2" charset="77"/>
             </a:endParaRPr>
           </a:p>
           <a:p>
@@ -7909,17 +7706,6 @@
             </a:endParaRPr>
           </a:p>
           <a:p>
-            <a:r>
-              <a:rPr lang="es-AR" sz="1600" dirty="0">
-                <a:solidFill>
-                  <a:schemeClr val="bg2"/>
-                </a:solidFill>
-                <a:latin typeface="Raleway" pitchFamily="2" charset="77"/>
-              </a:rPr>
-              <a:t>Dentro del contenedor correr</a:t>
-            </a:r>
-          </a:p>
-          <a:p>
             <a:pPr marL="114300" indent="0" algn="ctr">
               <a:buNone/>
             </a:pPr>
@@ -7932,74 +7718,191 @@
             </a:endParaRPr>
           </a:p>
           <a:p>
-            <a:pPr marL="114300" indent="0" algn="ctr">
+            <a:r>
+              <a:rPr lang="es-AR" sz="1600" dirty="0">
+                <a:solidFill>
+                  <a:schemeClr val="bg2"/>
+                </a:solidFill>
+                <a:latin typeface="Raleway" pitchFamily="2" charset="77"/>
+              </a:rPr>
+              <a:t>Rehacemos la imagen</a:t>
+            </a:r>
+          </a:p>
+          <a:p>
+            <a:r>
+              <a:rPr lang="es-AR" sz="1600" dirty="0">
+                <a:solidFill>
+                  <a:schemeClr val="bg2"/>
+                </a:solidFill>
+                <a:latin typeface="Raleway" pitchFamily="2" charset="77"/>
+              </a:rPr>
+              <a:t>Corremos contenedor en modo interactivo exponiendo puerto</a:t>
+            </a:r>
+          </a:p>
+          <a:p>
+            <a:pPr marL="114300" indent="0">
               <a:buNone/>
             </a:pPr>
+            <a:endParaRPr lang="es-AR" sz="1600" dirty="0">
+              <a:solidFill>
+                <a:schemeClr val="bg2"/>
+              </a:solidFill>
+              <a:latin typeface="Raleway" pitchFamily="2" charset="77"/>
+            </a:endParaRPr>
+          </a:p>
+          <a:p>
+            <a:pPr marL="114300" indent="0">
+              <a:buNone/>
+            </a:pPr>
             <a:r>
               <a:rPr lang="es-AR" sz="1600" dirty="0" err="1">
                 <a:solidFill>
-                  <a:schemeClr val="bg2"/>
-                </a:solidFill>
-                <a:latin typeface="Courier New" panose="02070309020205020404" pitchFamily="49" charset="0"/>
-                <a:cs typeface="Courier New" panose="02070309020205020404" pitchFamily="49" charset="0"/>
-              </a:rPr>
-              <a:t>ls</a:t>
+                  <a:srgbClr val="000000"/>
+                </a:solidFill>
+                <a:effectLst/>
+                <a:latin typeface="Courier New" panose="02070309020205020404" pitchFamily="49" charset="0"/>
+                <a:cs typeface="Courier New" panose="02070309020205020404" pitchFamily="49" charset="0"/>
+              </a:rPr>
+              <a:t>docker</a:t>
             </a:r>
             <a:r>
               <a:rPr lang="es-AR" sz="1600" dirty="0">
                 <a:solidFill>
-                  <a:schemeClr val="bg2"/>
-                </a:solidFill>
-                <a:latin typeface="Courier New" panose="02070309020205020404" pitchFamily="49" charset="0"/>
-                <a:cs typeface="Courier New" panose="02070309020205020404" pitchFamily="49" charset="0"/>
-              </a:rPr>
-              <a:t> -l /</a:t>
+                  <a:srgbClr val="000000"/>
+                </a:solidFill>
+                <a:effectLst/>
+                <a:latin typeface="Courier New" panose="02070309020205020404" pitchFamily="49" charset="0"/>
+                <a:cs typeface="Courier New" panose="02070309020205020404" pitchFamily="49" charset="0"/>
+              </a:rPr>
+              <a:t> run -</a:t>
             </a:r>
             <a:r>
               <a:rPr lang="es-AR" sz="1600" dirty="0" err="1">
                 <a:solidFill>
-                  <a:schemeClr val="bg2"/>
-                </a:solidFill>
-                <a:latin typeface="Courier New" panose="02070309020205020404" pitchFamily="49" charset="0"/>
-                <a:cs typeface="Courier New" panose="02070309020205020404" pitchFamily="49" charset="0"/>
-              </a:rPr>
-              <a:t>var</a:t>
+                  <a:srgbClr val="000000"/>
+                </a:solidFill>
+                <a:effectLst/>
+                <a:latin typeface="Courier New" panose="02070309020205020404" pitchFamily="49" charset="0"/>
+                <a:cs typeface="Courier New" panose="02070309020205020404" pitchFamily="49" charset="0"/>
+              </a:rPr>
+              <a:t>it</a:t>
             </a:r>
             <a:r>
               <a:rPr lang="es-AR" sz="1600" dirty="0">
                 <a:solidFill>
-                  <a:schemeClr val="bg2"/>
-                </a:solidFill>
-                <a:latin typeface="Courier New" panose="02070309020205020404" pitchFamily="49" charset="0"/>
-                <a:cs typeface="Courier New" panose="02070309020205020404" pitchFamily="49" charset="0"/>
-              </a:rPr>
-              <a:t>/escritorio </a:t>
-            </a:r>
-          </a:p>
-          <a:p>
-            <a:pPr marL="114300" indent="0" algn="ctr">
+                  <a:srgbClr val="000000"/>
+                </a:solidFill>
+                <a:effectLst/>
+                <a:latin typeface="Courier New" panose="02070309020205020404" pitchFamily="49" charset="0"/>
+                <a:cs typeface="Courier New" panose="02070309020205020404" pitchFamily="49" charset="0"/>
+              </a:rPr>
+              <a:t> --</a:t>
+            </a:r>
+            <a:r>
+              <a:rPr lang="es-AR" sz="1600" dirty="0" err="1">
+                <a:solidFill>
+                  <a:srgbClr val="000000"/>
+                </a:solidFill>
+                <a:effectLst/>
+                <a:latin typeface="Courier New" panose="02070309020205020404" pitchFamily="49" charset="0"/>
+                <a:cs typeface="Courier New" panose="02070309020205020404" pitchFamily="49" charset="0"/>
+              </a:rPr>
+              <a:t>rm</a:t>
+            </a:r>
+            <a:r>
+              <a:rPr lang="es-AR" sz="1600" dirty="0">
+                <a:solidFill>
+                  <a:srgbClr val="000000"/>
+                </a:solidFill>
+                <a:effectLst/>
+                <a:latin typeface="Courier New" panose="02070309020205020404" pitchFamily="49" charset="0"/>
+                <a:cs typeface="Courier New" panose="02070309020205020404" pitchFamily="49" charset="0"/>
+              </a:rPr>
+              <a:t> -p 80:80 </a:t>
+            </a:r>
+            <a:r>
+              <a:rPr lang="es-AR" sz="1600" dirty="0" err="1">
+                <a:solidFill>
+                  <a:srgbClr val="000000"/>
+                </a:solidFill>
+                <a:effectLst/>
+                <a:latin typeface="Courier New" panose="02070309020205020404" pitchFamily="49" charset="0"/>
+                <a:cs typeface="Courier New" panose="02070309020205020404" pitchFamily="49" charset="0"/>
+              </a:rPr>
+              <a:t>mywebapi</a:t>
+            </a:r>
+            <a:endParaRPr lang="es-AR" sz="1600" dirty="0">
+              <a:solidFill>
+                <a:srgbClr val="000000"/>
+              </a:solidFill>
+              <a:effectLst/>
+              <a:latin typeface="Courier New" panose="02070309020205020404" pitchFamily="49" charset="0"/>
+              <a:cs typeface="Courier New" panose="02070309020205020404" pitchFamily="49" charset="0"/>
+            </a:endParaRPr>
+          </a:p>
+          <a:p>
+            <a:pPr marL="114300" indent="0">
               <a:buNone/>
             </a:pPr>
+            <a:endParaRPr lang="es-AR" sz="1600" dirty="0">
+              <a:solidFill>
+                <a:schemeClr val="bg2"/>
+              </a:solidFill>
+              <a:latin typeface="Raleway" pitchFamily="2" charset="77"/>
+            </a:endParaRPr>
+          </a:p>
+          <a:p>
+            <a:r>
+              <a:rPr lang="es-AR" sz="1600" dirty="0">
+                <a:solidFill>
+                  <a:schemeClr val="bg2"/>
+                </a:solidFill>
+                <a:latin typeface="Raleway" pitchFamily="2" charset="77"/>
+              </a:rPr>
+              <a:t>Navegamos a http://localhost/</a:t>
+            </a:r>
             <a:r>
               <a:rPr lang="es-AR" sz="1600" dirty="0" err="1">
                 <a:solidFill>
                   <a:schemeClr val="bg2"/>
                 </a:solidFill>
-                <a:latin typeface="Courier New" panose="02070309020205020404" pitchFamily="49" charset="0"/>
-                <a:cs typeface="Courier New" panose="02070309020205020404" pitchFamily="49" charset="0"/>
-              </a:rPr>
-              <a:t>touch</a:t>
-            </a:r>
+                <a:latin typeface="Raleway" pitchFamily="2" charset="77"/>
+              </a:rPr>
+              <a:t>weatherforecast</a:t>
+            </a:r>
+            <a:endParaRPr lang="es-AR" sz="1600" dirty="0">
+              <a:solidFill>
+                <a:schemeClr val="bg2"/>
+              </a:solidFill>
+              <a:latin typeface="Raleway" pitchFamily="2" charset="77"/>
+            </a:endParaRPr>
+          </a:p>
+          <a:p>
             <a:r>
               <a:rPr lang="es-AR" sz="1600" dirty="0">
                 <a:solidFill>
                   <a:schemeClr val="bg2"/>
                 </a:solidFill>
-                <a:latin typeface="Courier New" panose="02070309020205020404" pitchFamily="49" charset="0"/>
-                <a:cs typeface="Courier New" panose="02070309020205020404" pitchFamily="49" charset="0"/>
-              </a:rPr>
-              <a:t> /</a:t>
-            </a:r>
+                <a:latin typeface="Raleway" pitchFamily="2" charset="77"/>
+              </a:rPr>
+              <a:t>Vemos que no se ejecuta automáticamente</a:t>
+            </a:r>
+          </a:p>
+          <a:p>
+            <a:pPr marL="114300" indent="0">
+              <a:buNone/>
+            </a:pPr>
+            <a:endParaRPr lang="es-AR" sz="1600" dirty="0">
+              <a:solidFill>
+                <a:schemeClr val="bg2"/>
+              </a:solidFill>
+              <a:latin typeface="Raleway" pitchFamily="2" charset="77"/>
+            </a:endParaRPr>
+          </a:p>
+          <a:p>
+            <a:pPr marL="114300" indent="0">
+              <a:buNone/>
+            </a:pPr>
             <a:r>
               <a:rPr lang="es-AR" sz="1600" dirty="0" err="1">
                 <a:solidFill>
@@ -8008,7 +7911,7 @@
                 <a:latin typeface="Courier New" panose="02070309020205020404" pitchFamily="49" charset="0"/>
                 <a:cs typeface="Courier New" panose="02070309020205020404" pitchFamily="49" charset="0"/>
               </a:rPr>
-              <a:t>var</a:t>
+              <a:t>dotnet</a:t>
             </a:r>
             <a:r>
               <a:rPr lang="es-AR" sz="1600" dirty="0">
@@ -8018,7 +7921,7 @@
                 <a:latin typeface="Courier New" panose="02070309020205020404" pitchFamily="49" charset="0"/>
                 <a:cs typeface="Courier New" panose="02070309020205020404" pitchFamily="49" charset="0"/>
               </a:rPr>
-              <a:t>/escritorio/</a:t>
+              <a:t> </a:t>
             </a:r>
             <a:r>
               <a:rPr lang="es-AR" sz="1600" dirty="0" err="1">
@@ -8028,7 +7931,7 @@
                 <a:latin typeface="Courier New" panose="02070309020205020404" pitchFamily="49" charset="0"/>
                 <a:cs typeface="Courier New" panose="02070309020205020404" pitchFamily="49" charset="0"/>
               </a:rPr>
-              <a:t>hola.txt</a:t>
+              <a:t>SimpleWebAPI.dll</a:t>
             </a:r>
             <a:endParaRPr lang="es-AR" sz="1600" dirty="0">
               <a:solidFill>
@@ -8054,11 +7957,38 @@
                 </a:solidFill>
                 <a:latin typeface="Raleway" pitchFamily="2" charset="77"/>
               </a:rPr>
-              <a:t>Verificar que el Archivo se ha creado en el escritorio o en el directorio home según corresponda.</a:t>
-            </a:r>
-          </a:p>
-          <a:p>
-            <a:pPr marL="114300" indent="0" algn="ctr">
+              <a:t>Volvemos a navegar a </a:t>
+            </a:r>
+            <a:r>
+              <a:rPr lang="es-AR" sz="1600" dirty="0">
+                <a:solidFill>
+                  <a:schemeClr val="bg2"/>
+                </a:solidFill>
+                <a:latin typeface="Raleway" pitchFamily="2" charset="77"/>
+                <a:hlinkClick r:id="rId4"/>
+              </a:rPr>
+              <a:t>http://localhost/weatherforecast</a:t>
+            </a:r>
+            <a:endParaRPr lang="es-AR" sz="1600" dirty="0">
+              <a:solidFill>
+                <a:schemeClr val="bg2"/>
+              </a:solidFill>
+              <a:latin typeface="Raleway" pitchFamily="2" charset="77"/>
+            </a:endParaRPr>
+          </a:p>
+          <a:p>
+            <a:r>
+              <a:rPr lang="es-AR" sz="1600" dirty="0">
+                <a:solidFill>
+                  <a:schemeClr val="bg2"/>
+                </a:solidFill>
+                <a:latin typeface="Raleway" pitchFamily="2" charset="77"/>
+              </a:rPr>
+              <a:t>Salimos del contenedor</a:t>
+            </a:r>
+          </a:p>
+          <a:p>
+            <a:pPr marL="114300" indent="0">
               <a:buNone/>
             </a:pPr>
             <a:endParaRPr lang="es-AR" sz="1600" dirty="0">
@@ -8070,6 +8000,30 @@
             </a:endParaRPr>
           </a:p>
           <a:p>
+            <a:pPr marL="114300" indent="0">
+              <a:buNone/>
+            </a:pPr>
+            <a:endParaRPr lang="es-AR" sz="1600" dirty="0">
+              <a:solidFill>
+                <a:schemeClr val="bg2"/>
+              </a:solidFill>
+              <a:latin typeface="Courier New" panose="02070309020205020404" pitchFamily="49" charset="0"/>
+              <a:cs typeface="Courier New" panose="02070309020205020404" pitchFamily="49" charset="0"/>
+            </a:endParaRPr>
+          </a:p>
+          <a:p>
+            <a:pPr marL="114300" indent="0" algn="ctr">
+              <a:buNone/>
+            </a:pPr>
+            <a:endParaRPr lang="es-AR" sz="1600" dirty="0">
+              <a:solidFill>
+                <a:schemeClr val="bg2"/>
+              </a:solidFill>
+              <a:latin typeface="Courier New" panose="02070309020205020404" pitchFamily="49" charset="0"/>
+              <a:cs typeface="Courier New" panose="02070309020205020404" pitchFamily="49" charset="0"/>
+            </a:endParaRPr>
+          </a:p>
+          <a:p>
             <a:endParaRPr lang="es-AR" sz="1600" dirty="0">
               <a:solidFill>
                 <a:schemeClr val="bg2"/>
@@ -8095,10 +8049,40 @@
           </a:p>
         </p:txBody>
       </p:sp>
+      <p:pic>
+        <p:nvPicPr>
+          <p:cNvPr id="3" name="Imagen 2">
+            <a:extLst>
+              <a:ext uri="{FF2B5EF4-FFF2-40B4-BE49-F238E27FC236}">
+                <a16:creationId xmlns:a16="http://schemas.microsoft.com/office/drawing/2014/main" id="{749D5C41-6CB4-65DA-A83F-D83235A2570E}"/>
+              </a:ext>
+            </a:extLst>
+          </p:cNvPr>
+          <p:cNvPicPr>
+            <a:picLocks noChangeAspect="1"/>
+          </p:cNvPicPr>
+          <p:nvPr/>
+        </p:nvPicPr>
+        <p:blipFill>
+          <a:blip r:embed="rId5"/>
+          <a:stretch>
+            <a:fillRect/>
+          </a:stretch>
+        </p:blipFill>
+        <p:spPr>
+          <a:xfrm>
+            <a:off x="4392385" y="1690688"/>
+            <a:ext cx="4038600" cy="444500"/>
+          </a:xfrm>
+          <a:prstGeom prst="rect">
+            <a:avLst/>
+          </a:prstGeom>
+        </p:spPr>
+      </p:pic>
     </p:spTree>
     <p:extLst>
       <p:ext uri="{BB962C8B-B14F-4D97-AF65-F5344CB8AC3E}">
-        <p14:creationId xmlns:p14="http://schemas.microsoft.com/office/powerpoint/2010/main" val="3319793511"/>
+        <p14:creationId xmlns:p14="http://schemas.microsoft.com/office/powerpoint/2010/main" val="1778389637"/>
       </p:ext>
     </p:extLst>
   </p:cSld>
@@ -8182,14 +8166,20 @@
           <a:lstStyle/>
           <a:p>
             <a:r>
-              <a:rPr lang="es-AR" dirty="0">
-                <a:solidFill>
-                  <a:schemeClr val="bg2"/>
-                </a:solidFill>
-                <a:latin typeface="Raleway" pitchFamily="2" charset="77"/>
-              </a:rPr>
-              <a:t>Puertos</a:t>
-            </a:r>
+              <a:rPr lang="es-AR" dirty="0" err="1">
+                <a:solidFill>
+                  <a:schemeClr val="bg2"/>
+                </a:solidFill>
+                <a:latin typeface="Raleway" pitchFamily="2" charset="77"/>
+              </a:rPr>
+              <a:t>Volumenes</a:t>
+            </a:r>
+            <a:endParaRPr lang="es-AR" dirty="0">
+              <a:solidFill>
+                <a:schemeClr val="bg2"/>
+              </a:solidFill>
+              <a:latin typeface="Raleway" pitchFamily="2" charset="77"/>
+            </a:endParaRPr>
           </a:p>
         </p:txBody>
       </p:sp>
@@ -8220,49 +8210,285 @@
           <a:lstStyle/>
           <a:p>
             <a:r>
-              <a:rPr lang="es-AR" sz="1200" dirty="0">
-                <a:solidFill>
-                  <a:schemeClr val="bg2"/>
-                </a:solidFill>
-                <a:latin typeface="Raleway" pitchFamily="2" charset="77"/>
-              </a:rPr>
-              <a:t>En el caso de aplicaciones web o base de datos donde se interactúa con estas aplicaciones a través de un puerto al cual hay que acceder, estos puertos están visibles solo dentro del contenedor. Si queremos acceder desde el exterior deberemos exponerlos.</a:t>
-            </a:r>
-          </a:p>
-          <a:p>
-            <a:r>
-              <a:rPr lang="es-AR" sz="1200" dirty="0">
-                <a:solidFill>
-                  <a:schemeClr val="bg2"/>
-                </a:solidFill>
-                <a:latin typeface="Raleway" pitchFamily="2" charset="77"/>
-              </a:rPr>
-              <a:t>Ejecutar la siguiente imagen, en este caso utilizamos la bandera -d (</a:t>
-            </a:r>
-            <a:r>
-              <a:rPr lang="es-AR" sz="1200" dirty="0" err="1">
-                <a:solidFill>
-                  <a:schemeClr val="bg2"/>
-                </a:solidFill>
-                <a:latin typeface="Raleway" pitchFamily="2" charset="77"/>
-              </a:rPr>
-              <a:t>detach</a:t>
-            </a:r>
-            <a:r>
-              <a:rPr lang="es-AR" sz="1200" dirty="0">
-                <a:solidFill>
-                  <a:schemeClr val="bg2"/>
-                </a:solidFill>
-                <a:latin typeface="Raleway" pitchFamily="2" charset="77"/>
-              </a:rPr>
-              <a:t>) para que nos devuelva el control de la consola:</a:t>
+              <a:rPr lang="es-AR" sz="1600" dirty="0">
+                <a:solidFill>
+                  <a:schemeClr val="bg2"/>
+                </a:solidFill>
+                <a:latin typeface="Raleway" pitchFamily="2" charset="77"/>
+              </a:rPr>
+              <a:t>Hasta este punto los contenedores ejecutados no tenían contacto con el exterior, ellos corrían en su propio entorno hasta que terminaran su ejecución. Ahora veremos cómo montar un volumen dentro del contenedor para visualizar por ejemplo archivos del sistema huésped:</a:t>
+            </a:r>
+          </a:p>
+          <a:p>
+            <a:r>
+              <a:rPr lang="es-AR" sz="1600" dirty="0">
+                <a:solidFill>
+                  <a:schemeClr val="bg2"/>
+                </a:solidFill>
+                <a:latin typeface="Raleway" pitchFamily="2" charset="77"/>
+              </a:rPr>
+              <a:t>Ejecutar el siguiente comando, cambiar </a:t>
+            </a:r>
+            <a:r>
+              <a:rPr lang="es-AR" sz="1600" dirty="0" err="1">
+                <a:solidFill>
+                  <a:schemeClr val="bg2"/>
+                </a:solidFill>
+                <a:latin typeface="Raleway" pitchFamily="2" charset="77"/>
+              </a:rPr>
+              <a:t>myusuario</a:t>
+            </a:r>
+            <a:r>
+              <a:rPr lang="es-AR" sz="1600" dirty="0">
+                <a:solidFill>
+                  <a:schemeClr val="bg2"/>
+                </a:solidFill>
+                <a:latin typeface="Raleway" pitchFamily="2" charset="77"/>
+              </a:rPr>
+              <a:t> por el usuario que corresponda. En Mac puede utilizarse /</a:t>
+            </a:r>
+            <a:r>
+              <a:rPr lang="es-AR" sz="1600" dirty="0" err="1">
+                <a:solidFill>
+                  <a:schemeClr val="bg2"/>
+                </a:solidFill>
+                <a:latin typeface="Raleway" pitchFamily="2" charset="77"/>
+              </a:rPr>
+              <a:t>Users</a:t>
+            </a:r>
+            <a:r>
+              <a:rPr lang="es-AR" sz="1600" dirty="0">
+                <a:solidFill>
+                  <a:schemeClr val="bg2"/>
+                </a:solidFill>
+                <a:latin typeface="Raleway" pitchFamily="2" charset="77"/>
+              </a:rPr>
+              <a:t>/</a:t>
+            </a:r>
+            <a:r>
+              <a:rPr lang="es-AR" sz="1600" dirty="0" err="1">
+                <a:solidFill>
+                  <a:schemeClr val="bg2"/>
+                </a:solidFill>
+                <a:latin typeface="Raleway" pitchFamily="2" charset="77"/>
+              </a:rPr>
+              <a:t>miusuario</a:t>
+            </a:r>
+            <a:r>
+              <a:rPr lang="es-AR" sz="1600" dirty="0">
+                <a:solidFill>
+                  <a:schemeClr val="bg2"/>
+                </a:solidFill>
+                <a:latin typeface="Raleway" pitchFamily="2" charset="77"/>
+              </a:rPr>
+              <a:t>/</a:t>
+            </a:r>
+            <a:r>
+              <a:rPr lang="es-AR" sz="1600" dirty="0" err="1">
+                <a:solidFill>
+                  <a:schemeClr val="bg2"/>
+                </a:solidFill>
+                <a:latin typeface="Raleway" pitchFamily="2" charset="77"/>
+              </a:rPr>
+              <a:t>temp</a:t>
+            </a:r>
+            <a:r>
+              <a:rPr lang="es-AR" sz="1600" dirty="0">
+                <a:solidFill>
+                  <a:schemeClr val="bg2"/>
+                </a:solidFill>
+                <a:latin typeface="Raleway" pitchFamily="2" charset="77"/>
+              </a:rPr>
+              <a:t>):</a:t>
             </a:r>
           </a:p>
           <a:p>
             <a:pPr marL="114300" indent="0" algn="ctr">
               <a:buNone/>
             </a:pPr>
-            <a:endParaRPr lang="es-AR" sz="1200" dirty="0">
+            <a:endParaRPr lang="es-AR" sz="1600" dirty="0">
+              <a:solidFill>
+                <a:schemeClr val="bg2"/>
+              </a:solidFill>
+              <a:latin typeface="Raleway" pitchFamily="2" charset="77"/>
+              <a:cs typeface="Courier New" panose="02070309020205020404" pitchFamily="49" charset="0"/>
+            </a:endParaRPr>
+          </a:p>
+          <a:p>
+            <a:pPr marL="114300" indent="0">
+              <a:buNone/>
+            </a:pPr>
+            <a:r>
+              <a:rPr lang="es-AR" sz="1400" dirty="0" err="1">
+                <a:solidFill>
+                  <a:schemeClr val="bg2"/>
+                </a:solidFill>
+                <a:latin typeface="Courier New" panose="02070309020205020404" pitchFamily="49" charset="0"/>
+                <a:cs typeface="Courier New" panose="02070309020205020404" pitchFamily="49" charset="0"/>
+              </a:rPr>
+              <a:t>docker</a:t>
+            </a:r>
+            <a:r>
+              <a:rPr lang="es-AR" sz="1400" dirty="0">
+                <a:solidFill>
+                  <a:schemeClr val="bg2"/>
+                </a:solidFill>
+                <a:latin typeface="Courier New" panose="02070309020205020404" pitchFamily="49" charset="0"/>
+                <a:cs typeface="Courier New" panose="02070309020205020404" pitchFamily="49" charset="0"/>
+              </a:rPr>
+              <a:t> run -</a:t>
+            </a:r>
+            <a:r>
+              <a:rPr lang="es-AR" sz="1400" dirty="0" err="1">
+                <a:solidFill>
+                  <a:schemeClr val="bg2"/>
+                </a:solidFill>
+                <a:latin typeface="Courier New" panose="02070309020205020404" pitchFamily="49" charset="0"/>
+                <a:cs typeface="Courier New" panose="02070309020205020404" pitchFamily="49" charset="0"/>
+              </a:rPr>
+              <a:t>it</a:t>
+            </a:r>
+            <a:r>
+              <a:rPr lang="es-AR" sz="1400" dirty="0">
+                <a:solidFill>
+                  <a:schemeClr val="bg2"/>
+                </a:solidFill>
+                <a:latin typeface="Courier New" panose="02070309020205020404" pitchFamily="49" charset="0"/>
+                <a:cs typeface="Courier New" panose="02070309020205020404" pitchFamily="49" charset="0"/>
+              </a:rPr>
+              <a:t> --</a:t>
+            </a:r>
+            <a:r>
+              <a:rPr lang="es-AR" sz="1400" dirty="0" err="1">
+                <a:solidFill>
+                  <a:schemeClr val="bg2"/>
+                </a:solidFill>
+                <a:latin typeface="Courier New" panose="02070309020205020404" pitchFamily="49" charset="0"/>
+                <a:cs typeface="Courier New" panose="02070309020205020404" pitchFamily="49" charset="0"/>
+              </a:rPr>
+              <a:t>rm</a:t>
+            </a:r>
+            <a:r>
+              <a:rPr lang="es-AR" sz="1400" dirty="0">
+                <a:solidFill>
+                  <a:schemeClr val="bg2"/>
+                </a:solidFill>
+                <a:latin typeface="Courier New" panose="02070309020205020404" pitchFamily="49" charset="0"/>
+                <a:cs typeface="Courier New" panose="02070309020205020404" pitchFamily="49" charset="0"/>
+              </a:rPr>
+              <a:t> -p 80:80 -v /</a:t>
+            </a:r>
+            <a:r>
+              <a:rPr lang="es-AR" sz="1400" dirty="0" err="1">
+                <a:solidFill>
+                  <a:schemeClr val="bg2"/>
+                </a:solidFill>
+                <a:latin typeface="Courier New" panose="02070309020205020404" pitchFamily="49" charset="0"/>
+                <a:cs typeface="Courier New" panose="02070309020205020404" pitchFamily="49" charset="0"/>
+              </a:rPr>
+              <a:t>Users</a:t>
+            </a:r>
+            <a:r>
+              <a:rPr lang="es-AR" sz="1400" dirty="0">
+                <a:solidFill>
+                  <a:schemeClr val="bg2"/>
+                </a:solidFill>
+                <a:latin typeface="Courier New" panose="02070309020205020404" pitchFamily="49" charset="0"/>
+                <a:cs typeface="Courier New" panose="02070309020205020404" pitchFamily="49" charset="0"/>
+              </a:rPr>
+              <a:t>/</a:t>
+            </a:r>
+            <a:r>
+              <a:rPr lang="es-AR" sz="1400" dirty="0" err="1">
+                <a:solidFill>
+                  <a:schemeClr val="bg2"/>
+                </a:solidFill>
+                <a:latin typeface="Courier New" panose="02070309020205020404" pitchFamily="49" charset="0"/>
+                <a:cs typeface="Courier New" panose="02070309020205020404" pitchFamily="49" charset="0"/>
+              </a:rPr>
+              <a:t>miuser</a:t>
+            </a:r>
+            <a:r>
+              <a:rPr lang="es-AR" sz="1400" dirty="0">
+                <a:solidFill>
+                  <a:schemeClr val="bg2"/>
+                </a:solidFill>
+                <a:latin typeface="Courier New" panose="02070309020205020404" pitchFamily="49" charset="0"/>
+                <a:cs typeface="Courier New" panose="02070309020205020404" pitchFamily="49" charset="0"/>
+              </a:rPr>
+              <a:t>/</a:t>
+            </a:r>
+            <a:r>
+              <a:rPr lang="es-AR" sz="1400" dirty="0" err="1">
+                <a:solidFill>
+                  <a:schemeClr val="bg2"/>
+                </a:solidFill>
+                <a:latin typeface="Courier New" panose="02070309020205020404" pitchFamily="49" charset="0"/>
+                <a:cs typeface="Courier New" panose="02070309020205020404" pitchFamily="49" charset="0"/>
+              </a:rPr>
+              <a:t>temp</a:t>
+            </a:r>
+            <a:r>
+              <a:rPr lang="es-AR" sz="1400" dirty="0">
+                <a:solidFill>
+                  <a:schemeClr val="bg2"/>
+                </a:solidFill>
+                <a:latin typeface="Courier New" panose="02070309020205020404" pitchFamily="49" charset="0"/>
+                <a:cs typeface="Courier New" panose="02070309020205020404" pitchFamily="49" charset="0"/>
+              </a:rPr>
+              <a:t>:/</a:t>
+            </a:r>
+            <a:r>
+              <a:rPr lang="es-AR" sz="1400" dirty="0" err="1">
+                <a:solidFill>
+                  <a:schemeClr val="bg2"/>
+                </a:solidFill>
+                <a:latin typeface="Courier New" panose="02070309020205020404" pitchFamily="49" charset="0"/>
+                <a:cs typeface="Courier New" panose="02070309020205020404" pitchFamily="49" charset="0"/>
+              </a:rPr>
+              <a:t>var</a:t>
+            </a:r>
+            <a:r>
+              <a:rPr lang="es-AR" sz="1400" dirty="0">
+                <a:solidFill>
+                  <a:schemeClr val="bg2"/>
+                </a:solidFill>
+                <a:latin typeface="Courier New" panose="02070309020205020404" pitchFamily="49" charset="0"/>
+                <a:cs typeface="Courier New" panose="02070309020205020404" pitchFamily="49" charset="0"/>
+              </a:rPr>
+              <a:t>/</a:t>
+            </a:r>
+            <a:r>
+              <a:rPr lang="es-AR" sz="1400" dirty="0" err="1">
+                <a:solidFill>
+                  <a:schemeClr val="bg2"/>
+                </a:solidFill>
+                <a:latin typeface="Courier New" panose="02070309020205020404" pitchFamily="49" charset="0"/>
+                <a:cs typeface="Courier New" panose="02070309020205020404" pitchFamily="49" charset="0"/>
+              </a:rPr>
+              <a:t>temp</a:t>
+            </a:r>
+            <a:r>
+              <a:rPr lang="es-AR" sz="1400" dirty="0">
+                <a:solidFill>
+                  <a:schemeClr val="bg2"/>
+                </a:solidFill>
+                <a:latin typeface="Courier New" panose="02070309020205020404" pitchFamily="49" charset="0"/>
+                <a:cs typeface="Courier New" panose="02070309020205020404" pitchFamily="49" charset="0"/>
+              </a:rPr>
+              <a:t>  </a:t>
+            </a:r>
+            <a:r>
+              <a:rPr lang="es-AR" sz="1400" dirty="0" err="1">
+                <a:solidFill>
+                  <a:schemeClr val="bg2"/>
+                </a:solidFill>
+                <a:latin typeface="Courier New" panose="02070309020205020404" pitchFamily="49" charset="0"/>
+                <a:cs typeface="Courier New" panose="02070309020205020404" pitchFamily="49" charset="0"/>
+              </a:rPr>
+              <a:t>mywebapi</a:t>
+            </a:r>
+            <a:endParaRPr lang="es-AR" sz="1400" dirty="0">
               <a:solidFill>
                 <a:schemeClr val="bg2"/>
               </a:solidFill>
@@ -8274,92 +8500,7 @@
             <a:pPr marL="114300" indent="0" algn="ctr">
               <a:buNone/>
             </a:pPr>
-            <a:r>
-              <a:rPr lang="es-AR" sz="1200" dirty="0" err="1">
-                <a:solidFill>
-                  <a:schemeClr val="bg2"/>
-                </a:solidFill>
-                <a:latin typeface="Courier New" panose="02070309020205020404" pitchFamily="49" charset="0"/>
-                <a:cs typeface="Courier New" panose="02070309020205020404" pitchFamily="49" charset="0"/>
-              </a:rPr>
-              <a:t>docker</a:t>
-            </a:r>
-            <a:r>
-              <a:rPr lang="es-AR" sz="1200" dirty="0">
-                <a:solidFill>
-                  <a:schemeClr val="bg2"/>
-                </a:solidFill>
-                <a:latin typeface="Courier New" panose="02070309020205020404" pitchFamily="49" charset="0"/>
-                <a:cs typeface="Courier New" panose="02070309020205020404" pitchFamily="49" charset="0"/>
-              </a:rPr>
-              <a:t> run -d </a:t>
-            </a:r>
-            <a:r>
-              <a:rPr lang="es-AR" sz="1200" dirty="0" err="1">
-                <a:solidFill>
-                  <a:schemeClr val="bg2"/>
-                </a:solidFill>
-                <a:latin typeface="Courier New" panose="02070309020205020404" pitchFamily="49" charset="0"/>
-                <a:cs typeface="Courier New" panose="02070309020205020404" pitchFamily="49" charset="0"/>
-              </a:rPr>
-              <a:t>daviey</a:t>
-            </a:r>
-            <a:r>
-              <a:rPr lang="es-AR" sz="1200" dirty="0">
-                <a:solidFill>
-                  <a:schemeClr val="bg2"/>
-                </a:solidFill>
-                <a:latin typeface="Courier New" panose="02070309020205020404" pitchFamily="49" charset="0"/>
-                <a:cs typeface="Courier New" panose="02070309020205020404" pitchFamily="49" charset="0"/>
-              </a:rPr>
-              <a:t>/</a:t>
-            </a:r>
-            <a:r>
-              <a:rPr lang="es-AR" sz="1200" dirty="0" err="1">
-                <a:solidFill>
-                  <a:schemeClr val="bg2"/>
-                </a:solidFill>
-                <a:latin typeface="Courier New" panose="02070309020205020404" pitchFamily="49" charset="0"/>
-                <a:cs typeface="Courier New" panose="02070309020205020404" pitchFamily="49" charset="0"/>
-              </a:rPr>
-              <a:t>nyan</a:t>
-            </a:r>
-            <a:r>
-              <a:rPr lang="es-AR" sz="1200" dirty="0">
-                <a:solidFill>
-                  <a:schemeClr val="bg2"/>
-                </a:solidFill>
-                <a:latin typeface="Courier New" panose="02070309020205020404" pitchFamily="49" charset="0"/>
-                <a:cs typeface="Courier New" panose="02070309020205020404" pitchFamily="49" charset="0"/>
-              </a:rPr>
-              <a:t>-</a:t>
-            </a:r>
-            <a:r>
-              <a:rPr lang="es-AR" sz="1200" dirty="0" err="1">
-                <a:solidFill>
-                  <a:schemeClr val="bg2"/>
-                </a:solidFill>
-                <a:latin typeface="Courier New" panose="02070309020205020404" pitchFamily="49" charset="0"/>
-                <a:cs typeface="Courier New" panose="02070309020205020404" pitchFamily="49" charset="0"/>
-              </a:rPr>
-              <a:t>cat</a:t>
-            </a:r>
-            <a:r>
-              <a:rPr lang="es-AR" sz="1200" dirty="0">
-                <a:solidFill>
-                  <a:schemeClr val="bg2"/>
-                </a:solidFill>
-                <a:latin typeface="Courier New" panose="02070309020205020404" pitchFamily="49" charset="0"/>
-                <a:cs typeface="Courier New" panose="02070309020205020404" pitchFamily="49" charset="0"/>
-              </a:rPr>
-              <a:t>-web</a:t>
-            </a:r>
-          </a:p>
-          <a:p>
-            <a:pPr marL="114300" indent="0" algn="ctr">
-              <a:buNone/>
-            </a:pPr>
-            <a:endParaRPr lang="es-AR" sz="1200" dirty="0">
+            <a:endParaRPr lang="es-AR" sz="1600" dirty="0">
               <a:solidFill>
                 <a:schemeClr val="bg2"/>
               </a:solidFill>
@@ -8369,38 +8510,30 @@
           </a:p>
           <a:p>
             <a:r>
-              <a:rPr lang="es-AR" sz="1200" dirty="0">
-                <a:solidFill>
-                  <a:schemeClr val="bg2"/>
-                </a:solidFill>
-                <a:latin typeface="Raleway" pitchFamily="2" charset="77"/>
-              </a:rPr>
-              <a:t>Si ejecutamos un comando </a:t>
-            </a:r>
-            <a:r>
-              <a:rPr lang="es-AR" sz="1200" dirty="0" err="1">
-                <a:solidFill>
-                  <a:schemeClr val="bg2"/>
-                </a:solidFill>
-                <a:latin typeface="Raleway" pitchFamily="2" charset="77"/>
-              </a:rPr>
-              <a:t>ps</a:t>
-            </a:r>
-            <a:r>
-              <a:rPr lang="es-AR" sz="1200" dirty="0">
-                <a:solidFill>
-                  <a:schemeClr val="bg2"/>
-                </a:solidFill>
-                <a:latin typeface="Raleway" pitchFamily="2" charset="77"/>
-              </a:rPr>
-              <a:t>:</a:t>
+              <a:rPr lang="es-AR" sz="1600" dirty="0">
+                <a:solidFill>
+                  <a:schemeClr val="bg2"/>
+                </a:solidFill>
+                <a:latin typeface="Raleway" pitchFamily="2" charset="77"/>
+              </a:rPr>
+              <a:t>Dentro del contenedor correr</a:t>
             </a:r>
           </a:p>
           <a:p>
             <a:pPr marL="114300" indent="0" algn="ctr">
               <a:buNone/>
             </a:pPr>
-            <a:endParaRPr lang="es-AR" sz="1200" dirty="0">
+            <a:r>
+              <a:rPr lang="es-AR" sz="1600" dirty="0" err="1">
+                <a:solidFill>
+                  <a:schemeClr val="bg2"/>
+                </a:solidFill>
+                <a:latin typeface="Courier New" panose="02070309020205020404" pitchFamily="49" charset="0"/>
+                <a:cs typeface="Courier New" panose="02070309020205020404" pitchFamily="49" charset="0"/>
+              </a:rPr>
+              <a:t>ls</a:t>
+            </a:r>
+            <a:endParaRPr lang="es-AR" sz="1600" dirty="0">
               <a:solidFill>
                 <a:schemeClr val="bg2"/>
               </a:solidFill>
@@ -8409,52 +8542,68 @@
             </a:endParaRPr>
           </a:p>
           <a:p>
-            <a:endParaRPr lang="es-AR" sz="1200" dirty="0">
-              <a:solidFill>
-                <a:schemeClr val="bg2"/>
-              </a:solidFill>
-              <a:latin typeface="Raleway" pitchFamily="2" charset="77"/>
-            </a:endParaRPr>
-          </a:p>
-          <a:p>
-            <a:endParaRPr lang="es-AR" sz="1200" dirty="0">
-              <a:solidFill>
-                <a:schemeClr val="bg2"/>
-              </a:solidFill>
-              <a:latin typeface="Raleway" pitchFamily="2" charset="77"/>
-            </a:endParaRPr>
-          </a:p>
-          <a:p>
-            <a:pPr marL="114300" indent="0">
+            <a:pPr marL="114300" indent="0" algn="ctr">
               <a:buNone/>
             </a:pPr>
-            <a:endParaRPr lang="es-AR" sz="1200" dirty="0">
-              <a:solidFill>
-                <a:schemeClr val="bg2"/>
-              </a:solidFill>
-              <a:latin typeface="Raleway" pitchFamily="2" charset="77"/>
-            </a:endParaRPr>
-          </a:p>
-          <a:p>
-            <a:r>
-              <a:rPr lang="es-AR" sz="1200" dirty="0">
-                <a:solidFill>
-                  <a:schemeClr val="bg2"/>
-                </a:solidFill>
-                <a:latin typeface="Raleway" pitchFamily="2" charset="77"/>
-              </a:rPr>
-              <a:t>Vemos que el contendor expone 2 puertos el 80 y el 443, pero si intentamos en un navegador acceder a http://localhost no sucede nada.</a:t>
-            </a:r>
-          </a:p>
-          <a:p>
-            <a:r>
-              <a:rPr lang="es-AR" sz="1200" dirty="0">
-                <a:solidFill>
-                  <a:schemeClr val="bg2"/>
-                </a:solidFill>
-                <a:latin typeface="Raleway" pitchFamily="2" charset="77"/>
-              </a:rPr>
-              <a:t>Procedemos entonces a parar y remover este contenedor:</a:t>
+            <a:r>
+              <a:rPr lang="es-AR" sz="1600" dirty="0" err="1">
+                <a:solidFill>
+                  <a:schemeClr val="bg2"/>
+                </a:solidFill>
+                <a:latin typeface="Courier New" panose="02070309020205020404" pitchFamily="49" charset="0"/>
+                <a:cs typeface="Courier New" panose="02070309020205020404" pitchFamily="49" charset="0"/>
+              </a:rPr>
+              <a:t>ls</a:t>
+            </a:r>
+            <a:r>
+              <a:rPr lang="es-AR" sz="1600" dirty="0">
+                <a:solidFill>
+                  <a:schemeClr val="bg2"/>
+                </a:solidFill>
+                <a:latin typeface="Courier New" panose="02070309020205020404" pitchFamily="49" charset="0"/>
+                <a:cs typeface="Courier New" panose="02070309020205020404" pitchFamily="49" charset="0"/>
+              </a:rPr>
+              <a:t> -l /</a:t>
+            </a:r>
+            <a:r>
+              <a:rPr lang="es-AR" sz="1600" dirty="0" err="1">
+                <a:solidFill>
+                  <a:schemeClr val="bg2"/>
+                </a:solidFill>
+                <a:latin typeface="Courier New" panose="02070309020205020404" pitchFamily="49" charset="0"/>
+                <a:cs typeface="Courier New" panose="02070309020205020404" pitchFamily="49" charset="0"/>
+              </a:rPr>
+              <a:t>var</a:t>
+            </a:r>
+            <a:r>
+              <a:rPr lang="es-AR" sz="1600" dirty="0">
+                <a:solidFill>
+                  <a:schemeClr val="bg2"/>
+                </a:solidFill>
+                <a:latin typeface="Courier New" panose="02070309020205020404" pitchFamily="49" charset="0"/>
+                <a:cs typeface="Courier New" panose="02070309020205020404" pitchFamily="49" charset="0"/>
+              </a:rPr>
+              <a:t>/</a:t>
+            </a:r>
+            <a:r>
+              <a:rPr lang="es-AR" sz="1600" dirty="0" err="1">
+                <a:solidFill>
+                  <a:schemeClr val="bg2"/>
+                </a:solidFill>
+                <a:latin typeface="Courier New" panose="02070309020205020404" pitchFamily="49" charset="0"/>
+                <a:cs typeface="Courier New" panose="02070309020205020404" pitchFamily="49" charset="0"/>
+              </a:rPr>
+              <a:t>temp</a:t>
+            </a:r>
+            <a:r>
+              <a:rPr lang="es-AR" sz="1600" dirty="0">
+                <a:solidFill>
+                  <a:schemeClr val="bg2"/>
+                </a:solidFill>
+                <a:latin typeface="Courier New" panose="02070309020205020404" pitchFamily="49" charset="0"/>
+                <a:cs typeface="Courier New" panose="02070309020205020404" pitchFamily="49" charset="0"/>
+              </a:rPr>
+              <a:t> </a:t>
             </a:r>
           </a:p>
           <a:p>
@@ -8462,96 +8611,76 @@
               <a:buNone/>
             </a:pPr>
             <a:r>
-              <a:rPr lang="es-AR" sz="1200" dirty="0" err="1">
-                <a:solidFill>
-                  <a:schemeClr val="bg2"/>
-                </a:solidFill>
-                <a:latin typeface="Courier New" panose="02070309020205020404" pitchFamily="49" charset="0"/>
-                <a:cs typeface="Courier New" panose="02070309020205020404" pitchFamily="49" charset="0"/>
-              </a:rPr>
-              <a:t>docker</a:t>
-            </a:r>
-            <a:r>
-              <a:rPr lang="es-AR" sz="1200" dirty="0">
-                <a:solidFill>
-                  <a:schemeClr val="bg2"/>
-                </a:solidFill>
-                <a:latin typeface="Courier New" panose="02070309020205020404" pitchFamily="49" charset="0"/>
-                <a:cs typeface="Courier New" panose="02070309020205020404" pitchFamily="49" charset="0"/>
-              </a:rPr>
-              <a:t> </a:t>
-            </a:r>
-            <a:r>
-              <a:rPr lang="es-AR" sz="1200" dirty="0" err="1">
-                <a:solidFill>
-                  <a:schemeClr val="bg2"/>
-                </a:solidFill>
-                <a:latin typeface="Courier New" panose="02070309020205020404" pitchFamily="49" charset="0"/>
-                <a:cs typeface="Courier New" panose="02070309020205020404" pitchFamily="49" charset="0"/>
-              </a:rPr>
-              <a:t>kill</a:t>
-            </a:r>
-            <a:r>
-              <a:rPr lang="es-AR" sz="1200" dirty="0">
-                <a:solidFill>
-                  <a:schemeClr val="bg2"/>
-                </a:solidFill>
-                <a:latin typeface="Courier New" panose="02070309020205020404" pitchFamily="49" charset="0"/>
-                <a:cs typeface="Courier New" panose="02070309020205020404" pitchFamily="49" charset="0"/>
-              </a:rPr>
-              <a:t> NOMBRE </a:t>
-            </a:r>
-          </a:p>
-          <a:p>
-            <a:pPr marL="114300" indent="0" algn="ctr">
-              <a:buNone/>
-            </a:pPr>
-            <a:r>
-              <a:rPr lang="es-AR" sz="1200" dirty="0" err="1">
-                <a:solidFill>
-                  <a:schemeClr val="bg2"/>
-                </a:solidFill>
-                <a:latin typeface="Courier New" panose="02070309020205020404" pitchFamily="49" charset="0"/>
-                <a:cs typeface="Courier New" panose="02070309020205020404" pitchFamily="49" charset="0"/>
-              </a:rPr>
-              <a:t>docker</a:t>
-            </a:r>
-            <a:r>
-              <a:rPr lang="es-AR" sz="1200" dirty="0">
-                <a:solidFill>
-                  <a:schemeClr val="bg2"/>
-                </a:solidFill>
-                <a:latin typeface="Courier New" panose="02070309020205020404" pitchFamily="49" charset="0"/>
-                <a:cs typeface="Courier New" panose="02070309020205020404" pitchFamily="49" charset="0"/>
-              </a:rPr>
-              <a:t> </a:t>
-            </a:r>
-            <a:r>
-              <a:rPr lang="es-AR" sz="1200" dirty="0" err="1">
-                <a:solidFill>
-                  <a:schemeClr val="bg2"/>
-                </a:solidFill>
-                <a:latin typeface="Courier New" panose="02070309020205020404" pitchFamily="49" charset="0"/>
-                <a:cs typeface="Courier New" panose="02070309020205020404" pitchFamily="49" charset="0"/>
-              </a:rPr>
-              <a:t>rm</a:t>
-            </a:r>
-            <a:r>
-              <a:rPr lang="es-AR" sz="1200" dirty="0">
-                <a:solidFill>
-                  <a:schemeClr val="bg2"/>
-                </a:solidFill>
-                <a:latin typeface="Courier New" panose="02070309020205020404" pitchFamily="49" charset="0"/>
-                <a:cs typeface="Courier New" panose="02070309020205020404" pitchFamily="49" charset="0"/>
-              </a:rPr>
-              <a:t> NOMBRE</a:t>
-            </a:r>
-          </a:p>
-          <a:p>
-            <a:pPr marL="114300" indent="0" algn="ctr">
-              <a:buNone/>
-            </a:pPr>
-            <a:endParaRPr lang="es-AR" sz="1200" dirty="0">
+              <a:rPr lang="es-AR" sz="1600" dirty="0" err="1">
+                <a:solidFill>
+                  <a:schemeClr val="bg2"/>
+                </a:solidFill>
+                <a:latin typeface="Courier New" panose="02070309020205020404" pitchFamily="49" charset="0"/>
+                <a:cs typeface="Courier New" panose="02070309020205020404" pitchFamily="49" charset="0"/>
+              </a:rPr>
+              <a:t>touch</a:t>
+            </a:r>
+            <a:r>
+              <a:rPr lang="es-AR" sz="1600" dirty="0">
+                <a:solidFill>
+                  <a:schemeClr val="bg2"/>
+                </a:solidFill>
+                <a:latin typeface="Courier New" panose="02070309020205020404" pitchFamily="49" charset="0"/>
+                <a:cs typeface="Courier New" panose="02070309020205020404" pitchFamily="49" charset="0"/>
+              </a:rPr>
+              <a:t> /</a:t>
+            </a:r>
+            <a:r>
+              <a:rPr lang="es-AR" sz="1600" dirty="0" err="1">
+                <a:solidFill>
+                  <a:schemeClr val="bg2"/>
+                </a:solidFill>
+                <a:latin typeface="Courier New" panose="02070309020205020404" pitchFamily="49" charset="0"/>
+                <a:cs typeface="Courier New" panose="02070309020205020404" pitchFamily="49" charset="0"/>
+              </a:rPr>
+              <a:t>var</a:t>
+            </a:r>
+            <a:r>
+              <a:rPr lang="es-AR" sz="1600" dirty="0">
+                <a:solidFill>
+                  <a:schemeClr val="bg2"/>
+                </a:solidFill>
+                <a:latin typeface="Courier New" panose="02070309020205020404" pitchFamily="49" charset="0"/>
+                <a:cs typeface="Courier New" panose="02070309020205020404" pitchFamily="49" charset="0"/>
+              </a:rPr>
+              <a:t>/</a:t>
+            </a:r>
+            <a:r>
+              <a:rPr lang="es-AR" sz="1600" dirty="0" err="1">
+                <a:solidFill>
+                  <a:schemeClr val="bg2"/>
+                </a:solidFill>
+                <a:latin typeface="Courier New" panose="02070309020205020404" pitchFamily="49" charset="0"/>
+                <a:cs typeface="Courier New" panose="02070309020205020404" pitchFamily="49" charset="0"/>
+              </a:rPr>
+              <a:t>temp</a:t>
+            </a:r>
+            <a:r>
+              <a:rPr lang="es-AR" sz="1600" dirty="0">
+                <a:solidFill>
+                  <a:schemeClr val="bg2"/>
+                </a:solidFill>
+                <a:latin typeface="Courier New" panose="02070309020205020404" pitchFamily="49" charset="0"/>
+                <a:cs typeface="Courier New" panose="02070309020205020404" pitchFamily="49" charset="0"/>
+              </a:rPr>
+              <a:t>/</a:t>
+            </a:r>
+            <a:r>
+              <a:rPr lang="es-AR" sz="1600" dirty="0" err="1">
+                <a:solidFill>
+                  <a:schemeClr val="bg2"/>
+                </a:solidFill>
+                <a:latin typeface="Courier New" panose="02070309020205020404" pitchFamily="49" charset="0"/>
+                <a:cs typeface="Courier New" panose="02070309020205020404" pitchFamily="49" charset="0"/>
+              </a:rPr>
+              <a:t>hola.txt</a:t>
+            </a:r>
+            <a:endParaRPr lang="es-AR" sz="1600" dirty="0">
               <a:solidFill>
                 <a:schemeClr val="bg2"/>
               </a:solidFill>
@@ -8560,21 +8689,47 @@
             </a:endParaRPr>
           </a:p>
           <a:p>
-            <a:r>
-              <a:rPr lang="es-AR" sz="1200" dirty="0">
-                <a:solidFill>
-                  <a:schemeClr val="bg2"/>
-                </a:solidFill>
-                <a:latin typeface="Raleway" pitchFamily="2" charset="77"/>
-              </a:rPr>
-              <a:t>Vamos a volver a correrlo otra vez, pero publicando uno de los puertos solamente, el este caso el 80</a:t>
+            <a:endParaRPr lang="es-AR" sz="1600" dirty="0">
+              <a:solidFill>
+                <a:schemeClr val="bg2"/>
+              </a:solidFill>
+              <a:latin typeface="Raleway" pitchFamily="2" charset="77"/>
+            </a:endParaRPr>
+          </a:p>
+          <a:p>
+            <a:r>
+              <a:rPr lang="es-AR" sz="1600" dirty="0">
+                <a:solidFill>
+                  <a:schemeClr val="bg2"/>
+                </a:solidFill>
+                <a:latin typeface="Raleway" pitchFamily="2" charset="77"/>
+              </a:rPr>
+              <a:t>Verificar que el Archivo se ha creado en el directorio del </a:t>
+            </a:r>
+            <a:r>
+              <a:rPr lang="es-AR" sz="1600" dirty="0" err="1">
+                <a:solidFill>
+                  <a:schemeClr val="bg2"/>
+                </a:solidFill>
+                <a:latin typeface="Raleway" pitchFamily="2" charset="77"/>
+              </a:rPr>
+              <a:t>guest</a:t>
+            </a:r>
+            <a:r>
+              <a:rPr lang="es-AR" sz="1600" dirty="0">
+                <a:solidFill>
+                  <a:schemeClr val="bg2"/>
+                </a:solidFill>
+                <a:latin typeface="Raleway" pitchFamily="2" charset="77"/>
+              </a:rPr>
+              <a:t> y del host</a:t>
             </a:r>
           </a:p>
           <a:p>
             <a:pPr marL="114300" indent="0" algn="ctr">
               <a:buNone/>
             </a:pPr>
-            <a:endParaRPr lang="es-AR" sz="1200" dirty="0">
+            <a:endParaRPr lang="es-AR" sz="1600" dirty="0">
               <a:solidFill>
                 <a:schemeClr val="bg2"/>
               </a:solidFill>
@@ -8583,127 +8738,7 @@
             </a:endParaRPr>
           </a:p>
           <a:p>
-            <a:pPr marL="114300" indent="0" algn="ctr">
-              <a:buNone/>
-            </a:pPr>
-            <a:r>
-              <a:rPr lang="es-AR" sz="1200" dirty="0" err="1">
-                <a:solidFill>
-                  <a:schemeClr val="bg2"/>
-                </a:solidFill>
-                <a:latin typeface="Courier New" panose="02070309020205020404" pitchFamily="49" charset="0"/>
-                <a:cs typeface="Courier New" panose="02070309020205020404" pitchFamily="49" charset="0"/>
-              </a:rPr>
-              <a:t>docker</a:t>
-            </a:r>
-            <a:r>
-              <a:rPr lang="es-AR" sz="1200" dirty="0">
-                <a:solidFill>
-                  <a:schemeClr val="bg2"/>
-                </a:solidFill>
-                <a:latin typeface="Courier New" panose="02070309020205020404" pitchFamily="49" charset="0"/>
-                <a:cs typeface="Courier New" panose="02070309020205020404" pitchFamily="49" charset="0"/>
-              </a:rPr>
-              <a:t> run -d -p 80:80 </a:t>
-            </a:r>
-            <a:r>
-              <a:rPr lang="es-AR" sz="1200" dirty="0" err="1">
-                <a:solidFill>
-                  <a:schemeClr val="bg2"/>
-                </a:solidFill>
-                <a:latin typeface="Courier New" panose="02070309020205020404" pitchFamily="49" charset="0"/>
-                <a:cs typeface="Courier New" panose="02070309020205020404" pitchFamily="49" charset="0"/>
-              </a:rPr>
-              <a:t>daviey</a:t>
-            </a:r>
-            <a:r>
-              <a:rPr lang="es-AR" sz="1200" dirty="0">
-                <a:solidFill>
-                  <a:schemeClr val="bg2"/>
-                </a:solidFill>
-                <a:latin typeface="Courier New" panose="02070309020205020404" pitchFamily="49" charset="0"/>
-                <a:cs typeface="Courier New" panose="02070309020205020404" pitchFamily="49" charset="0"/>
-              </a:rPr>
-              <a:t>/</a:t>
-            </a:r>
-            <a:r>
-              <a:rPr lang="es-AR" sz="1200" dirty="0" err="1">
-                <a:solidFill>
-                  <a:schemeClr val="bg2"/>
-                </a:solidFill>
-                <a:latin typeface="Courier New" panose="02070309020205020404" pitchFamily="49" charset="0"/>
-                <a:cs typeface="Courier New" panose="02070309020205020404" pitchFamily="49" charset="0"/>
-              </a:rPr>
-              <a:t>nyan</a:t>
-            </a:r>
-            <a:r>
-              <a:rPr lang="es-AR" sz="1200" dirty="0">
-                <a:solidFill>
-                  <a:schemeClr val="bg2"/>
-                </a:solidFill>
-                <a:latin typeface="Courier New" panose="02070309020205020404" pitchFamily="49" charset="0"/>
-                <a:cs typeface="Courier New" panose="02070309020205020404" pitchFamily="49" charset="0"/>
-              </a:rPr>
-              <a:t>-</a:t>
-            </a:r>
-            <a:r>
-              <a:rPr lang="es-AR" sz="1200" dirty="0" err="1">
-                <a:solidFill>
-                  <a:schemeClr val="bg2"/>
-                </a:solidFill>
-                <a:latin typeface="Courier New" panose="02070309020205020404" pitchFamily="49" charset="0"/>
-                <a:cs typeface="Courier New" panose="02070309020205020404" pitchFamily="49" charset="0"/>
-              </a:rPr>
-              <a:t>cat</a:t>
-            </a:r>
-            <a:r>
-              <a:rPr lang="es-AR" sz="1200" dirty="0">
-                <a:solidFill>
-                  <a:schemeClr val="bg2"/>
-                </a:solidFill>
-                <a:latin typeface="Courier New" panose="02070309020205020404" pitchFamily="49" charset="0"/>
-                <a:cs typeface="Courier New" panose="02070309020205020404" pitchFamily="49" charset="0"/>
-              </a:rPr>
-              <a:t>-web</a:t>
-            </a:r>
-          </a:p>
-          <a:p>
-            <a:pPr marL="114300" indent="0" algn="ctr">
-              <a:buNone/>
-            </a:pPr>
-            <a:endParaRPr lang="es-AR" sz="1200" dirty="0">
-              <a:solidFill>
-                <a:schemeClr val="bg2"/>
-              </a:solidFill>
-              <a:latin typeface="Courier New" panose="02070309020205020404" pitchFamily="49" charset="0"/>
-              <a:cs typeface="Courier New" panose="02070309020205020404" pitchFamily="49" charset="0"/>
-            </a:endParaRPr>
-          </a:p>
-          <a:p>
-            <a:r>
-              <a:rPr lang="es-AR" sz="1200" dirty="0">
-                <a:solidFill>
-                  <a:schemeClr val="bg2"/>
-                </a:solidFill>
-                <a:latin typeface="Raleway" pitchFamily="2" charset="77"/>
-              </a:rPr>
-              <a:t>Accedamos nuevamente a http://localhost y expliquemos que sucede.</a:t>
-            </a:r>
-          </a:p>
-          <a:p>
-            <a:pPr marL="114300" indent="0" algn="ctr">
-              <a:buNone/>
-            </a:pPr>
-            <a:endParaRPr lang="es-AR" sz="1200" dirty="0">
-              <a:solidFill>
-                <a:schemeClr val="bg2"/>
-              </a:solidFill>
-              <a:latin typeface="Courier New" panose="02070309020205020404" pitchFamily="49" charset="0"/>
-              <a:cs typeface="Courier New" panose="02070309020205020404" pitchFamily="49" charset="0"/>
-            </a:endParaRPr>
-          </a:p>
-          <a:p>
-            <a:endParaRPr lang="es-AR" sz="1200" dirty="0">
+            <a:endParaRPr lang="es-AR" sz="1600" dirty="0">
               <a:solidFill>
                 <a:schemeClr val="bg2"/>
               </a:solidFill>
@@ -8711,49 +8746,27 @@
             </a:endParaRPr>
           </a:p>
           <a:p>
-            <a:endParaRPr lang="es-AR" sz="1200" dirty="0">
+            <a:endParaRPr lang="es-AR" sz="1600" dirty="0">
               <a:solidFill>
                 <a:schemeClr val="bg2"/>
               </a:solidFill>
               <a:latin typeface="Raleway" pitchFamily="2" charset="77"/>
             </a:endParaRPr>
           </a:p>
+          <a:p>
+            <a:endParaRPr lang="es-AR" sz="1600" dirty="0">
+              <a:solidFill>
+                <a:schemeClr val="bg2"/>
+              </a:solidFill>
+              <a:latin typeface="Raleway" pitchFamily="2" charset="77"/>
+            </a:endParaRPr>
+          </a:p>
         </p:txBody>
       </p:sp>
-      <p:pic>
-        <p:nvPicPr>
-          <p:cNvPr id="3" name="Imagen 2">
-            <a:extLst>
-              <a:ext uri="{FF2B5EF4-FFF2-40B4-BE49-F238E27FC236}">
-                <a16:creationId xmlns:a16="http://schemas.microsoft.com/office/drawing/2014/main" id="{8FB74DFB-7F04-0052-C6A2-DAB9151F2F78}"/>
-              </a:ext>
-            </a:extLst>
-          </p:cNvPr>
-          <p:cNvPicPr>
-            <a:picLocks noChangeAspect="1"/>
-          </p:cNvPicPr>
-          <p:nvPr/>
-        </p:nvPicPr>
-        <p:blipFill>
-          <a:blip r:embed="rId4"/>
-          <a:stretch>
-            <a:fillRect/>
-          </a:stretch>
-        </p:blipFill>
-        <p:spPr>
-          <a:xfrm>
-            <a:off x="4992413" y="3022555"/>
-            <a:ext cx="6484883" cy="555464"/>
-          </a:xfrm>
-          <a:prstGeom prst="rect">
-            <a:avLst/>
-          </a:prstGeom>
-        </p:spPr>
-      </p:pic>
     </p:spTree>
     <p:extLst>
       <p:ext uri="{BB962C8B-B14F-4D97-AF65-F5344CB8AC3E}">
-        <p14:creationId xmlns:p14="http://schemas.microsoft.com/office/powerpoint/2010/main" val="2202623383"/>
+        <p14:creationId xmlns:p14="http://schemas.microsoft.com/office/powerpoint/2010/main" val="3319793511"/>
       </p:ext>
     </p:extLst>
   </p:cSld>

</xml_diff>